<commit_message>
Completed Updates to Module 10
</commit_message>
<xml_diff>
--- a/Modules/10-Chef_Intermediate.pptx
+++ b/Modules/10-Chef_Intermediate.pptx
@@ -221,7 +221,7 @@
           <a:p>
             <a:fld id="{9AF33057-6D84-D14E-AD32-9E8926ACCADD}" type="datetimeFigureOut">
               <a:rPr lang="en-US" smtClean="0"/>
-              <a:t>6/22/2015</a:t>
+              <a:t>6/24/2015</a:t>
             </a:fld>
             <a:endParaRPr lang="en-US" dirty="0"/>
           </a:p>
@@ -914,101 +914,37 @@
       </p:sp>
       <p:sp>
         <p:nvSpPr>
-          <p:cNvPr id="4" name="Holder 4"/>
+          <p:cNvPr id="7" name="Slide Number Placeholder 6"/>
           <p:cNvSpPr>
             <a:spLocks noGrp="1"/>
           </p:cNvSpPr>
           <p:nvPr>
-            <p:ph type="ftr" sz="quarter" idx="5"/>
+            <p:ph type="sldNum" sz="quarter" idx="10"/>
           </p:nvPr>
         </p:nvSpPr>
-        <p:spPr/>
-        <p:txBody>
-          <a:bodyPr lIns="0" tIns="0" rIns="0" bIns="0"/>
+        <p:spPr>
+          <a:xfrm>
+            <a:off x="6299200" y="8458200"/>
+            <a:ext cx="3657600" cy="485775"/>
+          </a:xfrm>
+          <a:prstGeom prst="rect">
+            <a:avLst/>
+          </a:prstGeom>
+        </p:spPr>
+        <p:txBody>
+          <a:bodyPr/>
           <a:lstStyle>
             <a:lvl1pPr algn="ctr">
-              <a:defRPr>
-                <a:solidFill>
-                  <a:schemeClr val="tx1">
-                    <a:tint val="75000"/>
-                  </a:schemeClr>
-                </a:solidFill>
-              </a:defRPr>
+              <a:defRPr/>
             </a:lvl1pPr>
           </a:lstStyle>
           <a:p>
-            <a:endParaRPr dirty="0"/>
-          </a:p>
-        </p:txBody>
-      </p:sp>
-      <p:sp>
-        <p:nvSpPr>
-          <p:cNvPr id="5" name="Holder 5"/>
-          <p:cNvSpPr>
-            <a:spLocks noGrp="1"/>
-          </p:cNvSpPr>
-          <p:nvPr>
-            <p:ph type="dt" sz="half" idx="6"/>
-          </p:nvPr>
-        </p:nvSpPr>
-        <p:spPr/>
-        <p:txBody>
-          <a:bodyPr lIns="0" tIns="0" rIns="0" bIns="0"/>
-          <a:lstStyle>
-            <a:lvl1pPr algn="l">
-              <a:defRPr>
-                <a:solidFill>
-                  <a:schemeClr val="tx1">
-                    <a:tint val="75000"/>
-                  </a:schemeClr>
-                </a:solidFill>
-              </a:defRPr>
-            </a:lvl1pPr>
-          </a:lstStyle>
-          <a:p>
-            <a:fld id="{1D8BD707-D9CF-40AE-B4C6-C98DA3205C09}" type="datetimeFigureOut">
-              <a:rPr lang="en-US"/>
-              <a:t>6/22/2015</a:t>
-            </a:fld>
-            <a:endParaRPr lang="en-US" dirty="0"/>
-          </a:p>
-        </p:txBody>
-      </p:sp>
-      <p:sp>
-        <p:nvSpPr>
-          <p:cNvPr id="6" name="Holder 6"/>
-          <p:cNvSpPr>
-            <a:spLocks noGrp="1"/>
-          </p:cNvSpPr>
-          <p:nvPr>
-            <p:ph type="sldNum" sz="quarter" idx="7"/>
-          </p:nvPr>
-        </p:nvSpPr>
-        <p:spPr/>
-        <p:txBody>
-          <a:bodyPr lIns="0" tIns="0" rIns="0" bIns="0"/>
-          <a:lstStyle>
-            <a:lvl1pPr>
-              <a:defRPr sz="1000" b="0" i="0">
-                <a:solidFill>
-                  <a:schemeClr val="tx1"/>
-                </a:solidFill>
-                <a:latin typeface="Gill Sans MT"/>
-                <a:cs typeface="Gill Sans MT"/>
-              </a:defRPr>
-            </a:lvl1pPr>
-          </a:lstStyle>
-          <a:p>
-            <a:pPr marL="25400">
-              <a:lnSpc>
-                <a:spcPct val="100000"/>
-              </a:lnSpc>
-            </a:pPr>
-            <a:fld id="{81D60167-4931-47E6-BA6A-407CBD079E47}" type="slidenum">
-              <a:rPr dirty="0"/>
+            <a:fld id="{F32B063D-AEFC-43D4-892A-5496DB603272}" type="slidenum">
+              <a:rPr lang="en-US" smtClean="0"/>
+              <a:pPr/>
               <a:t>‹#›</a:t>
             </a:fld>
-            <a:endParaRPr dirty="0"/>
+            <a:endParaRPr lang="en-US"/>
           </a:p>
         </p:txBody>
       </p:sp>
@@ -1021,7 +957,7 @@
 </file>
 
 <file path=ppt/slideLayouts/slideLayout2.xml><?xml version="1.0" encoding="utf-8"?>
-<p:sldLayout xmlns:a="http://schemas.openxmlformats.org/drawingml/2006/main" xmlns:r="http://schemas.openxmlformats.org/officeDocument/2006/relationships" xmlns:p="http://schemas.openxmlformats.org/presentationml/2006/main" type="obj" preserve="1">
+<p:sldLayout xmlns:a="http://schemas.openxmlformats.org/drawingml/2006/main" xmlns:r="http://schemas.openxmlformats.org/officeDocument/2006/relationships" xmlns:p="http://schemas.openxmlformats.org/presentationml/2006/main" preserve="1" userDrawn="1">
   <p:cSld name="Title and Content">
     <p:spTree>
       <p:nvGrpSpPr>
@@ -1039,35 +975,6 @@
       </p:grpSpPr>
       <p:sp>
         <p:nvSpPr>
-          <p:cNvPr id="2" name="Holder 2"/>
-          <p:cNvSpPr>
-            <a:spLocks noGrp="1"/>
-          </p:cNvSpPr>
-          <p:nvPr>
-            <p:ph type="title"/>
-          </p:nvPr>
-        </p:nvSpPr>
-        <p:spPr/>
-        <p:txBody>
-          <a:bodyPr lIns="0" tIns="0" rIns="0" bIns="0"/>
-          <a:lstStyle>
-            <a:lvl1pPr>
-              <a:defRPr sz="7200" b="1" i="0">
-                <a:solidFill>
-                  <a:schemeClr val="bg1"/>
-                </a:solidFill>
-                <a:latin typeface="Arial"/>
-                <a:cs typeface="Arial"/>
-              </a:defRPr>
-            </a:lvl1pPr>
-          </a:lstStyle>
-          <a:p>
-            <a:endParaRPr/>
-          </a:p>
-        </p:txBody>
-      </p:sp>
-      <p:sp>
-        <p:nvSpPr>
           <p:cNvPr id="3" name="Holder 3"/>
           <p:cNvSpPr>
             <a:spLocks noGrp="1"/>
@@ -1097,12 +1004,12 @@
       </p:sp>
       <p:sp>
         <p:nvSpPr>
-          <p:cNvPr id="7" name="Date Placeholder 6"/>
+          <p:cNvPr id="12" name="Title 11"/>
           <p:cNvSpPr>
             <a:spLocks noGrp="1"/>
           </p:cNvSpPr>
           <p:nvPr>
-            <p:ph type="dt" sz="half" idx="10"/>
+            <p:ph type="title"/>
           </p:nvPr>
         </p:nvSpPr>
         <p:spPr/>
@@ -1110,58 +1017,44 @@
           <a:bodyPr/>
           <a:lstStyle/>
           <a:p>
-            <a:fld id="{1D8BD707-D9CF-40AE-B4C6-C98DA3205C09}" type="datetimeFigureOut">
+            <a:r>
               <a:rPr lang="en-US" smtClean="0"/>
-              <a:t>6/22/2015</a:t>
-            </a:fld>
-            <a:endParaRPr lang="en-US" dirty="0"/>
-          </a:p>
-        </p:txBody>
-      </p:sp>
-      <p:sp>
-        <p:nvSpPr>
-          <p:cNvPr id="8" name="Footer Placeholder 7"/>
+              <a:t>Click to edit Master title style</a:t>
+            </a:r>
+            <a:endParaRPr lang="en-US"/>
+          </a:p>
+        </p:txBody>
+      </p:sp>
+      <p:sp>
+        <p:nvSpPr>
+          <p:cNvPr id="16" name="Slide Number Placeholder 6"/>
           <p:cNvSpPr>
             <a:spLocks noGrp="1"/>
           </p:cNvSpPr>
           <p:nvPr>
-            <p:ph type="ftr" sz="quarter" idx="11"/>
+            <p:ph type="sldNum" sz="quarter" idx="10"/>
           </p:nvPr>
         </p:nvSpPr>
-        <p:spPr/>
+        <p:spPr>
+          <a:xfrm>
+            <a:off x="6299200" y="8458200"/>
+            <a:ext cx="3657600" cy="485775"/>
+          </a:xfrm>
+        </p:spPr>
         <p:txBody>
           <a:bodyPr/>
-          <a:lstStyle/>
-          <a:p>
-            <a:endParaRPr lang="en-US" dirty="0"/>
-          </a:p>
-        </p:txBody>
-      </p:sp>
-      <p:sp>
-        <p:nvSpPr>
-          <p:cNvPr id="9" name="Slide Number Placeholder 8"/>
-          <p:cNvSpPr>
-            <a:spLocks noGrp="1"/>
-          </p:cNvSpPr>
-          <p:nvPr>
-            <p:ph type="sldNum" sz="quarter" idx="12"/>
-          </p:nvPr>
-        </p:nvSpPr>
-        <p:spPr/>
-        <p:txBody>
-          <a:bodyPr/>
-          <a:lstStyle/>
-          <a:p>
-            <a:pPr marL="25400">
-              <a:lnSpc>
-                <a:spcPct val="100000"/>
-              </a:lnSpc>
-            </a:pPr>
-            <a:fld id="{81D60167-4931-47E6-BA6A-407CBD079E47}" type="slidenum">
+          <a:lstStyle>
+            <a:lvl1pPr algn="ctr">
+              <a:defRPr/>
+            </a:lvl1pPr>
+          </a:lstStyle>
+          <a:p>
+            <a:fld id="{F32B063D-AEFC-43D4-892A-5496DB603272}" type="slidenum">
               <a:rPr lang="en-US" smtClean="0"/>
+              <a:pPr/>
               <a:t>‹#›</a:t>
             </a:fld>
-            <a:endParaRPr lang="en-US" dirty="0"/>
+            <a:endParaRPr lang="en-US"/>
           </a:p>
         </p:txBody>
       </p:sp>
@@ -4312,101 +4205,34 @@
       </p:sp>
       <p:sp>
         <p:nvSpPr>
-          <p:cNvPr id="5" name="Holder 5"/>
+          <p:cNvPr id="54" name="Slide Number Placeholder 6"/>
           <p:cNvSpPr>
             <a:spLocks noGrp="1"/>
           </p:cNvSpPr>
           <p:nvPr>
-            <p:ph type="ftr" sz="quarter" idx="5"/>
+            <p:ph type="sldNum" sz="quarter" idx="10"/>
           </p:nvPr>
         </p:nvSpPr>
-        <p:spPr/>
-        <p:txBody>
-          <a:bodyPr lIns="0" tIns="0" rIns="0" bIns="0"/>
+        <p:spPr>
+          <a:xfrm>
+            <a:off x="6299200" y="8458200"/>
+            <a:ext cx="3657600" cy="485775"/>
+          </a:xfrm>
+        </p:spPr>
+        <p:txBody>
+          <a:bodyPr/>
           <a:lstStyle>
             <a:lvl1pPr algn="ctr">
-              <a:defRPr>
-                <a:solidFill>
-                  <a:schemeClr val="tx1">
-                    <a:tint val="75000"/>
-                  </a:schemeClr>
-                </a:solidFill>
-              </a:defRPr>
+              <a:defRPr/>
             </a:lvl1pPr>
           </a:lstStyle>
           <a:p>
-            <a:endParaRPr dirty="0"/>
-          </a:p>
-        </p:txBody>
-      </p:sp>
-      <p:sp>
-        <p:nvSpPr>
-          <p:cNvPr id="6" name="Holder 6"/>
-          <p:cNvSpPr>
-            <a:spLocks noGrp="1"/>
-          </p:cNvSpPr>
-          <p:nvPr>
-            <p:ph type="dt" sz="half" idx="6"/>
-          </p:nvPr>
-        </p:nvSpPr>
-        <p:spPr/>
-        <p:txBody>
-          <a:bodyPr lIns="0" tIns="0" rIns="0" bIns="0"/>
-          <a:lstStyle>
-            <a:lvl1pPr algn="l">
-              <a:defRPr>
-                <a:solidFill>
-                  <a:schemeClr val="tx1">
-                    <a:tint val="75000"/>
-                  </a:schemeClr>
-                </a:solidFill>
-              </a:defRPr>
-            </a:lvl1pPr>
-          </a:lstStyle>
-          <a:p>
-            <a:fld id="{1D8BD707-D9CF-40AE-B4C6-C98DA3205C09}" type="datetimeFigureOut">
-              <a:rPr lang="en-US"/>
-              <a:t>6/22/2015</a:t>
-            </a:fld>
-            <a:endParaRPr lang="en-US" dirty="0"/>
-          </a:p>
-        </p:txBody>
-      </p:sp>
-      <p:sp>
-        <p:nvSpPr>
-          <p:cNvPr id="7" name="Holder 7"/>
-          <p:cNvSpPr>
-            <a:spLocks noGrp="1"/>
-          </p:cNvSpPr>
-          <p:nvPr>
-            <p:ph type="sldNum" sz="quarter" idx="7"/>
-          </p:nvPr>
-        </p:nvSpPr>
-        <p:spPr/>
-        <p:txBody>
-          <a:bodyPr lIns="0" tIns="0" rIns="0" bIns="0"/>
-          <a:lstStyle>
-            <a:lvl1pPr>
-              <a:defRPr sz="1000" b="0" i="0">
-                <a:solidFill>
-                  <a:schemeClr val="tx1"/>
-                </a:solidFill>
-                <a:latin typeface="Gill Sans MT"/>
-                <a:cs typeface="Gill Sans MT"/>
-              </a:defRPr>
-            </a:lvl1pPr>
-          </a:lstStyle>
-          <a:p>
-            <a:pPr marL="25400">
-              <a:lnSpc>
-                <a:spcPct val="100000"/>
-              </a:lnSpc>
-            </a:pPr>
-            <a:fld id="{81D60167-4931-47E6-BA6A-407CBD079E47}" type="slidenum">
-              <a:rPr dirty="0"/>
+            <a:fld id="{F32B063D-AEFC-43D4-892A-5496DB603272}" type="slidenum">
+              <a:rPr lang="en-US" smtClean="0"/>
+              <a:pPr/>
               <a:t>‹#›</a:t>
             </a:fld>
-            <a:endParaRPr dirty="0"/>
+            <a:endParaRPr lang="en-US"/>
           </a:p>
         </p:txBody>
       </p:sp>
@@ -4466,101 +4292,34 @@
       </p:sp>
       <p:sp>
         <p:nvSpPr>
-          <p:cNvPr id="3" name="Holder 3"/>
+          <p:cNvPr id="9" name="Slide Number Placeholder 6"/>
           <p:cNvSpPr>
             <a:spLocks noGrp="1"/>
           </p:cNvSpPr>
           <p:nvPr>
-            <p:ph type="ftr" sz="quarter" idx="5"/>
+            <p:ph type="sldNum" sz="quarter" idx="10"/>
           </p:nvPr>
         </p:nvSpPr>
-        <p:spPr/>
-        <p:txBody>
-          <a:bodyPr lIns="0" tIns="0" rIns="0" bIns="0"/>
+        <p:spPr>
+          <a:xfrm>
+            <a:off x="6299200" y="8458200"/>
+            <a:ext cx="3657600" cy="485775"/>
+          </a:xfrm>
+        </p:spPr>
+        <p:txBody>
+          <a:bodyPr/>
           <a:lstStyle>
             <a:lvl1pPr algn="ctr">
-              <a:defRPr>
-                <a:solidFill>
-                  <a:schemeClr val="tx1">
-                    <a:tint val="75000"/>
-                  </a:schemeClr>
-                </a:solidFill>
-              </a:defRPr>
+              <a:defRPr/>
             </a:lvl1pPr>
           </a:lstStyle>
           <a:p>
-            <a:endParaRPr dirty="0"/>
-          </a:p>
-        </p:txBody>
-      </p:sp>
-      <p:sp>
-        <p:nvSpPr>
-          <p:cNvPr id="4" name="Holder 4"/>
-          <p:cNvSpPr>
-            <a:spLocks noGrp="1"/>
-          </p:cNvSpPr>
-          <p:nvPr>
-            <p:ph type="dt" sz="half" idx="6"/>
-          </p:nvPr>
-        </p:nvSpPr>
-        <p:spPr/>
-        <p:txBody>
-          <a:bodyPr lIns="0" tIns="0" rIns="0" bIns="0"/>
-          <a:lstStyle>
-            <a:lvl1pPr algn="l">
-              <a:defRPr>
-                <a:solidFill>
-                  <a:schemeClr val="tx1">
-                    <a:tint val="75000"/>
-                  </a:schemeClr>
-                </a:solidFill>
-              </a:defRPr>
-            </a:lvl1pPr>
-          </a:lstStyle>
-          <a:p>
-            <a:fld id="{1D8BD707-D9CF-40AE-B4C6-C98DA3205C09}" type="datetimeFigureOut">
-              <a:rPr lang="en-US"/>
-              <a:t>6/22/2015</a:t>
-            </a:fld>
-            <a:endParaRPr lang="en-US" dirty="0"/>
-          </a:p>
-        </p:txBody>
-      </p:sp>
-      <p:sp>
-        <p:nvSpPr>
-          <p:cNvPr id="5" name="Holder 5"/>
-          <p:cNvSpPr>
-            <a:spLocks noGrp="1"/>
-          </p:cNvSpPr>
-          <p:nvPr>
-            <p:ph type="sldNum" sz="quarter" idx="7"/>
-          </p:nvPr>
-        </p:nvSpPr>
-        <p:spPr/>
-        <p:txBody>
-          <a:bodyPr lIns="0" tIns="0" rIns="0" bIns="0"/>
-          <a:lstStyle>
-            <a:lvl1pPr>
-              <a:defRPr sz="1000" b="0" i="0">
-                <a:solidFill>
-                  <a:schemeClr val="tx1"/>
-                </a:solidFill>
-                <a:latin typeface="Gill Sans MT"/>
-                <a:cs typeface="Gill Sans MT"/>
-              </a:defRPr>
-            </a:lvl1pPr>
-          </a:lstStyle>
-          <a:p>
-            <a:pPr marL="25400">
-              <a:lnSpc>
-                <a:spcPct val="100000"/>
-              </a:lnSpc>
-            </a:pPr>
-            <a:fld id="{81D60167-4931-47E6-BA6A-407CBD079E47}" type="slidenum">
-              <a:rPr dirty="0"/>
+            <a:fld id="{F32B063D-AEFC-43D4-892A-5496DB603272}" type="slidenum">
+              <a:rPr lang="en-US" smtClean="0"/>
+              <a:pPr/>
               <a:t>‹#›</a:t>
             </a:fld>
-            <a:endParaRPr dirty="0"/>
+            <a:endParaRPr lang="en-US"/>
           </a:p>
         </p:txBody>
       </p:sp>
@@ -7560,56 +7319,6 @@
       </p:sp>
       <p:sp>
         <p:nvSpPr>
-          <p:cNvPr id="52" name="bk object 52"/>
-          <p:cNvSpPr/>
-          <p:nvPr/>
-        </p:nvSpPr>
-        <p:spPr>
-          <a:xfrm>
-            <a:off x="0" y="8978900"/>
-            <a:ext cx="16256000" cy="165100"/>
-          </a:xfrm>
-          <a:custGeom>
-            <a:avLst/>
-            <a:gdLst/>
-            <a:ahLst/>
-            <a:cxnLst/>
-            <a:rect l="l" t="t" r="r" b="b"/>
-            <a:pathLst>
-              <a:path w="16256000" h="165100">
-                <a:moveTo>
-                  <a:pt x="16256000" y="0"/>
-                </a:moveTo>
-                <a:lnTo>
-                  <a:pt x="0" y="0"/>
-                </a:lnTo>
-                <a:lnTo>
-                  <a:pt x="0" y="165100"/>
-                </a:lnTo>
-                <a:lnTo>
-                  <a:pt x="16256000" y="165100"/>
-                </a:lnTo>
-                <a:lnTo>
-                  <a:pt x="16256000" y="0"/>
-                </a:lnTo>
-                <a:close/>
-              </a:path>
-            </a:pathLst>
-          </a:custGeom>
-          <a:solidFill>
-            <a:srgbClr val="F38C24"/>
-          </a:solidFill>
-        </p:spPr>
-        <p:txBody>
-          <a:bodyPr wrap="square" lIns="0" tIns="0" rIns="0" bIns="0" rtlCol="0"/>
-          <a:lstStyle/>
-          <a:p>
-            <a:endParaRPr dirty="0"/>
-          </a:p>
-        </p:txBody>
-      </p:sp>
-      <p:sp>
-        <p:nvSpPr>
           <p:cNvPr id="53" name="bk object 53"/>
           <p:cNvSpPr/>
           <p:nvPr/>
@@ -7639,101 +7348,34 @@
       </p:sp>
       <p:sp>
         <p:nvSpPr>
-          <p:cNvPr id="2" name="Holder 2"/>
+          <p:cNvPr id="55" name="Slide Number Placeholder 6"/>
           <p:cNvSpPr>
             <a:spLocks noGrp="1"/>
           </p:cNvSpPr>
           <p:nvPr>
-            <p:ph type="ftr" sz="quarter" idx="5"/>
+            <p:ph type="sldNum" sz="quarter" idx="10"/>
           </p:nvPr>
         </p:nvSpPr>
-        <p:spPr/>
-        <p:txBody>
-          <a:bodyPr lIns="0" tIns="0" rIns="0" bIns="0"/>
+        <p:spPr>
+          <a:xfrm>
+            <a:off x="6299200" y="8458200"/>
+            <a:ext cx="3657600" cy="485775"/>
+          </a:xfrm>
+        </p:spPr>
+        <p:txBody>
+          <a:bodyPr/>
           <a:lstStyle>
             <a:lvl1pPr algn="ctr">
-              <a:defRPr>
-                <a:solidFill>
-                  <a:schemeClr val="tx1">
-                    <a:tint val="75000"/>
-                  </a:schemeClr>
-                </a:solidFill>
-              </a:defRPr>
+              <a:defRPr/>
             </a:lvl1pPr>
           </a:lstStyle>
           <a:p>
-            <a:endParaRPr dirty="0"/>
-          </a:p>
-        </p:txBody>
-      </p:sp>
-      <p:sp>
-        <p:nvSpPr>
-          <p:cNvPr id="3" name="Holder 3"/>
-          <p:cNvSpPr>
-            <a:spLocks noGrp="1"/>
-          </p:cNvSpPr>
-          <p:nvPr>
-            <p:ph type="dt" sz="half" idx="6"/>
-          </p:nvPr>
-        </p:nvSpPr>
-        <p:spPr/>
-        <p:txBody>
-          <a:bodyPr lIns="0" tIns="0" rIns="0" bIns="0"/>
-          <a:lstStyle>
-            <a:lvl1pPr algn="l">
-              <a:defRPr>
-                <a:solidFill>
-                  <a:schemeClr val="tx1">
-                    <a:tint val="75000"/>
-                  </a:schemeClr>
-                </a:solidFill>
-              </a:defRPr>
-            </a:lvl1pPr>
-          </a:lstStyle>
-          <a:p>
-            <a:fld id="{1D8BD707-D9CF-40AE-B4C6-C98DA3205C09}" type="datetimeFigureOut">
-              <a:rPr lang="en-US"/>
-              <a:t>6/22/2015</a:t>
-            </a:fld>
-            <a:endParaRPr lang="en-US" dirty="0"/>
-          </a:p>
-        </p:txBody>
-      </p:sp>
-      <p:sp>
-        <p:nvSpPr>
-          <p:cNvPr id="4" name="Holder 4"/>
-          <p:cNvSpPr>
-            <a:spLocks noGrp="1"/>
-          </p:cNvSpPr>
-          <p:nvPr>
-            <p:ph type="sldNum" sz="quarter" idx="7"/>
-          </p:nvPr>
-        </p:nvSpPr>
-        <p:spPr/>
-        <p:txBody>
-          <a:bodyPr lIns="0" tIns="0" rIns="0" bIns="0"/>
-          <a:lstStyle>
-            <a:lvl1pPr>
-              <a:defRPr sz="1000" b="0" i="0">
-                <a:solidFill>
-                  <a:schemeClr val="tx1"/>
-                </a:solidFill>
-                <a:latin typeface="Gill Sans MT"/>
-                <a:cs typeface="Gill Sans MT"/>
-              </a:defRPr>
-            </a:lvl1pPr>
-          </a:lstStyle>
-          <a:p>
-            <a:pPr marL="25400">
-              <a:lnSpc>
-                <a:spcPct val="100000"/>
-              </a:lnSpc>
-            </a:pPr>
-            <a:fld id="{81D60167-4931-47E6-BA6A-407CBD079E47}" type="slidenum">
-              <a:rPr dirty="0"/>
+            <a:fld id="{F32B063D-AEFC-43D4-892A-5496DB603272}" type="slidenum">
+              <a:rPr lang="en-US" smtClean="0"/>
+              <a:pPr/>
               <a:t>‹#›</a:t>
             </a:fld>
-            <a:endParaRPr dirty="0"/>
+            <a:endParaRPr lang="en-US"/>
           </a:p>
         </p:txBody>
       </p:sp>
@@ -8000,13 +7642,13 @@
   <p:clrMapOvr>
     <a:overrideClrMapping bg1="lt1" tx1="dk1" bg2="lt2" tx2="dk2" accent1="accent1" accent2="accent2" accent3="accent3" accent4="accent4" accent5="accent5" accent6="accent6" hlink="hlink" folHlink="folHlink"/>
   </p:clrMapOvr>
-  <mc:AlternateContent xmlns:mc="http://schemas.openxmlformats.org/markup-compatibility/2006">
-    <mc:Choice xmlns:p14="http://schemas.microsoft.com/office/powerpoint/2010/main" Requires="p14">
+  <mc:AlternateContent xmlns:mc="http://schemas.openxmlformats.org/markup-compatibility/2006" xmlns:p14="http://schemas.microsoft.com/office/powerpoint/2010/main">
+    <mc:Choice Requires="p14">
       <p:transition spd="med" p14:dur="700">
         <p:fade/>
       </p:transition>
     </mc:Choice>
-    <mc:Fallback>
+    <mc:Fallback xmlns="">
       <p:transition spd="med">
         <p:fade/>
       </p:transition>
@@ -8177,131 +7819,37 @@
       </p:sp>
       <p:sp>
         <p:nvSpPr>
-          <p:cNvPr id="4" name="Holder 4"/>
+          <p:cNvPr id="11" name="Slide Number Placeholder 6"/>
           <p:cNvSpPr>
             <a:spLocks noGrp="1"/>
           </p:cNvSpPr>
           <p:nvPr>
-            <p:ph type="ftr" sz="quarter" idx="5"/>
+            <p:ph type="sldNum" sz="quarter" idx="4"/>
           </p:nvPr>
         </p:nvSpPr>
         <p:spPr>
           <a:xfrm>
-            <a:off x="5527040" y="8503920"/>
-            <a:ext cx="5201919" cy="457200"/>
+            <a:off x="6299200" y="8458200"/>
+            <a:ext cx="3657600" cy="485775"/>
           </a:xfrm>
           <a:prstGeom prst="rect">
             <a:avLst/>
           </a:prstGeom>
         </p:spPr>
         <p:txBody>
-          <a:bodyPr wrap="square" lIns="0" tIns="0" rIns="0" bIns="0">
-            <a:spAutoFit/>
-          </a:bodyPr>
+          <a:bodyPr/>
           <a:lstStyle>
             <a:lvl1pPr algn="ctr">
-              <a:defRPr>
-                <a:solidFill>
-                  <a:schemeClr val="tx1">
-                    <a:tint val="75000"/>
-                  </a:schemeClr>
-                </a:solidFill>
-              </a:defRPr>
+              <a:defRPr/>
             </a:lvl1pPr>
           </a:lstStyle>
           <a:p>
-            <a:endParaRPr dirty="0"/>
-          </a:p>
-        </p:txBody>
-      </p:sp>
-      <p:sp>
-        <p:nvSpPr>
-          <p:cNvPr id="5" name="Holder 5"/>
-          <p:cNvSpPr>
-            <a:spLocks noGrp="1"/>
-          </p:cNvSpPr>
-          <p:nvPr>
-            <p:ph type="dt" sz="half" idx="6"/>
-          </p:nvPr>
-        </p:nvSpPr>
-        <p:spPr>
-          <a:xfrm>
-            <a:off x="812800" y="8503920"/>
-            <a:ext cx="3738880" cy="457200"/>
-          </a:xfrm>
-          <a:prstGeom prst="rect">
-            <a:avLst/>
-          </a:prstGeom>
-        </p:spPr>
-        <p:txBody>
-          <a:bodyPr wrap="square" lIns="0" tIns="0" rIns="0" bIns="0">
-            <a:spAutoFit/>
-          </a:bodyPr>
-          <a:lstStyle>
-            <a:lvl1pPr algn="l">
-              <a:defRPr>
-                <a:solidFill>
-                  <a:schemeClr val="tx1">
-                    <a:tint val="75000"/>
-                  </a:schemeClr>
-                </a:solidFill>
-              </a:defRPr>
-            </a:lvl1pPr>
-          </a:lstStyle>
-          <a:p>
-            <a:fld id="{1D8BD707-D9CF-40AE-B4C6-C98DA3205C09}" type="datetimeFigureOut">
-              <a:rPr lang="en-US"/>
-              <a:t>6/22/2015</a:t>
-            </a:fld>
-            <a:endParaRPr lang="en-US" dirty="0"/>
-          </a:p>
-        </p:txBody>
-      </p:sp>
-      <p:sp>
-        <p:nvSpPr>
-          <p:cNvPr id="6" name="Holder 6"/>
-          <p:cNvSpPr>
-            <a:spLocks noGrp="1"/>
-          </p:cNvSpPr>
-          <p:nvPr>
-            <p:ph type="sldNum" sz="quarter" idx="7"/>
-          </p:nvPr>
-        </p:nvSpPr>
-        <p:spPr>
-          <a:xfrm>
-            <a:off x="7988999" y="8860816"/>
-            <a:ext cx="241300" cy="152400"/>
-          </a:xfrm>
-          <a:prstGeom prst="rect">
-            <a:avLst/>
-          </a:prstGeom>
-        </p:spPr>
-        <p:txBody>
-          <a:bodyPr wrap="square" lIns="0" tIns="0" rIns="0" bIns="0">
-            <a:spAutoFit/>
-          </a:bodyPr>
-          <a:lstStyle>
-            <a:lvl1pPr>
-              <a:defRPr sz="1000" b="0" i="0">
-                <a:solidFill>
-                  <a:schemeClr val="tx1"/>
-                </a:solidFill>
-                <a:latin typeface="Gill Sans MT"/>
-                <a:cs typeface="Gill Sans MT"/>
-              </a:defRPr>
-            </a:lvl1pPr>
-          </a:lstStyle>
-          <a:p>
-            <a:pPr marL="25400">
-              <a:lnSpc>
-                <a:spcPct val="100000"/>
-              </a:lnSpc>
-            </a:pPr>
-            <a:fld id="{81D60167-4931-47E6-BA6A-407CBD079E47}" type="slidenum">
-              <a:rPr dirty="0"/>
+            <a:fld id="{F32B063D-AEFC-43D4-892A-5496DB603272}" type="slidenum">
+              <a:rPr lang="en-US" smtClean="0"/>
+              <a:pPr/>
               <a:t>‹#›</a:t>
             </a:fld>
-            <a:endParaRPr dirty="0"/>
+            <a:endParaRPr lang="en-US"/>
           </a:p>
         </p:txBody>
       </p:sp>
@@ -8316,6 +7864,7 @@
     <p:sldLayoutId id="2147483665" r:id="rId5"/>
     <p:sldLayoutId id="2147483666" r:id="rId6"/>
   </p:sldLayoutIdLst>
+  <p:hf hdr="0" ftr="0" dt="0"/>
   <p:txStyles>
     <p:titleStyle>
       <a:lvl1pPr>
@@ -8529,56 +8078,6 @@
       </p:sp>
       <p:sp>
         <p:nvSpPr>
-          <p:cNvPr id="3" name="object 3"/>
-          <p:cNvSpPr/>
-          <p:nvPr/>
-        </p:nvSpPr>
-        <p:spPr>
-          <a:xfrm>
-            <a:off x="0" y="8178800"/>
-            <a:ext cx="16256000" cy="965200"/>
-          </a:xfrm>
-          <a:custGeom>
-            <a:avLst/>
-            <a:gdLst/>
-            <a:ahLst/>
-            <a:cxnLst/>
-            <a:rect l="l" t="t" r="r" b="b"/>
-            <a:pathLst>
-              <a:path w="16256000" h="965200">
-                <a:moveTo>
-                  <a:pt x="16256000" y="0"/>
-                </a:moveTo>
-                <a:lnTo>
-                  <a:pt x="0" y="0"/>
-                </a:lnTo>
-                <a:lnTo>
-                  <a:pt x="0" y="965200"/>
-                </a:lnTo>
-                <a:lnTo>
-                  <a:pt x="16256000" y="965200"/>
-                </a:lnTo>
-                <a:lnTo>
-                  <a:pt x="16256000" y="0"/>
-                </a:lnTo>
-                <a:close/>
-              </a:path>
-            </a:pathLst>
-          </a:custGeom>
-          <a:solidFill>
-            <a:srgbClr val="F38C24"/>
-          </a:solidFill>
-        </p:spPr>
-        <p:txBody>
-          <a:bodyPr wrap="square" lIns="0" tIns="0" rIns="0" bIns="0" rtlCol="0"/>
-          <a:lstStyle/>
-          <a:p>
-            <a:endParaRPr dirty="0"/>
-          </a:p>
-        </p:txBody>
-      </p:sp>
-      <p:sp>
-        <p:nvSpPr>
           <p:cNvPr id="4" name="object 4"/>
           <p:cNvSpPr/>
           <p:nvPr/>
@@ -18798,6 +18297,110 @@
               <a:rPr sz="9600" dirty="0"/>
               <a:t>c</a:t>
             </a:r>
+          </a:p>
+        </p:txBody>
+      </p:sp>
+      <p:pic>
+        <p:nvPicPr>
+          <p:cNvPr id="128" name="Picture 127"/>
+          <p:cNvPicPr>
+            <a:picLocks noChangeAspect="1"/>
+          </p:cNvPicPr>
+          <p:nvPr/>
+        </p:nvPicPr>
+        <p:blipFill>
+          <a:blip r:embed="rId4" cstate="print">
+            <a:extLst>
+              <a:ext uri="{28A0092B-C50C-407E-A947-70E740481C1C}">
+                <a14:useLocalDpi xmlns:a14="http://schemas.microsoft.com/office/drawing/2010/main" val="0"/>
+              </a:ext>
+            </a:extLst>
+          </a:blip>
+          <a:stretch>
+            <a:fillRect/>
+          </a:stretch>
+        </p:blipFill>
+        <p:spPr>
+          <a:xfrm>
+            <a:off x="15114787" y="8153400"/>
+            <a:ext cx="938013" cy="1025973"/>
+          </a:xfrm>
+          <a:prstGeom prst="rect">
+            <a:avLst/>
+          </a:prstGeom>
+        </p:spPr>
+      </p:pic>
+      <p:sp>
+        <p:nvSpPr>
+          <p:cNvPr id="129" name="object 3"/>
+          <p:cNvSpPr/>
+          <p:nvPr/>
+        </p:nvSpPr>
+        <p:spPr>
+          <a:xfrm>
+            <a:off x="0" y="8039100"/>
+            <a:ext cx="16256000" cy="152400"/>
+          </a:xfrm>
+          <a:custGeom>
+            <a:avLst/>
+            <a:gdLst/>
+            <a:ahLst/>
+            <a:cxnLst/>
+            <a:rect l="l" t="t" r="r" b="b"/>
+            <a:pathLst>
+              <a:path w="16256000" h="152400">
+                <a:moveTo>
+                  <a:pt x="0" y="152400"/>
+                </a:moveTo>
+                <a:lnTo>
+                  <a:pt x="16256000" y="152400"/>
+                </a:lnTo>
+                <a:lnTo>
+                  <a:pt x="16256000" y="0"/>
+                </a:lnTo>
+                <a:lnTo>
+                  <a:pt x="0" y="0"/>
+                </a:lnTo>
+                <a:lnTo>
+                  <a:pt x="0" y="152400"/>
+                </a:lnTo>
+                <a:close/>
+              </a:path>
+            </a:pathLst>
+          </a:custGeom>
+          <a:solidFill>
+            <a:srgbClr val="F38C24"/>
+          </a:solidFill>
+        </p:spPr>
+        <p:txBody>
+          <a:bodyPr wrap="square" lIns="0" tIns="0" rIns="0" bIns="0" rtlCol="0"/>
+          <a:lstStyle/>
+          <a:p>
+            <a:endParaRPr/>
+          </a:p>
+        </p:txBody>
+      </p:sp>
+      <p:sp>
+        <p:nvSpPr>
+          <p:cNvPr id="127" name="Slide Number Placeholder 126"/>
+          <p:cNvSpPr>
+            <a:spLocks noGrp="1"/>
+          </p:cNvSpPr>
+          <p:nvPr>
+            <p:ph type="sldNum" sz="quarter" idx="10"/>
+          </p:nvPr>
+        </p:nvSpPr>
+        <p:spPr/>
+        <p:txBody>
+          <a:bodyPr/>
+          <a:lstStyle/>
+          <a:p>
+            <a:fld id="{F32B063D-AEFC-43D4-892A-5496DB603272}" type="slidenum">
+              <a:rPr lang="en-US" smtClean="0"/>
+              <a:pPr/>
+              <a:t>1</a:t>
+            </a:fld>
+            <a:endParaRPr lang="en-US"/>
           </a:p>
         </p:txBody>
       </p:sp>
@@ -22281,6 +21884,30 @@
           </a:p>
         </p:txBody>
       </p:sp>
+      <p:sp>
+        <p:nvSpPr>
+          <p:cNvPr id="6" name="Slide Number Placeholder 5"/>
+          <p:cNvSpPr>
+            <a:spLocks noGrp="1"/>
+          </p:cNvSpPr>
+          <p:nvPr>
+            <p:ph type="sldNum" sz="quarter" idx="10"/>
+          </p:nvPr>
+        </p:nvSpPr>
+        <p:spPr/>
+        <p:txBody>
+          <a:bodyPr/>
+          <a:lstStyle/>
+          <a:p>
+            <a:fld id="{F32B063D-AEFC-43D4-892A-5496DB603272}" type="slidenum">
+              <a:rPr lang="en-US" smtClean="0"/>
+              <a:pPr/>
+              <a:t>10</a:t>
+            </a:fld>
+            <a:endParaRPr lang="en-US"/>
+          </a:p>
+        </p:txBody>
+      </p:sp>
     </p:spTree>
   </p:cSld>
   <p:clrMapOvr>
@@ -23977,6 +23604,30 @@
           </a:p>
         </p:txBody>
       </p:sp>
+      <p:sp>
+        <p:nvSpPr>
+          <p:cNvPr id="4" name="Slide Number Placeholder 3"/>
+          <p:cNvSpPr>
+            <a:spLocks noGrp="1"/>
+          </p:cNvSpPr>
+          <p:nvPr>
+            <p:ph type="sldNum" sz="quarter" idx="10"/>
+          </p:nvPr>
+        </p:nvSpPr>
+        <p:spPr/>
+        <p:txBody>
+          <a:bodyPr/>
+          <a:lstStyle/>
+          <a:p>
+            <a:fld id="{F32B063D-AEFC-43D4-892A-5496DB603272}" type="slidenum">
+              <a:rPr lang="en-US" smtClean="0"/>
+              <a:pPr/>
+              <a:t>11</a:t>
+            </a:fld>
+            <a:endParaRPr lang="en-US"/>
+          </a:p>
+        </p:txBody>
+      </p:sp>
     </p:spTree>
   </p:cSld>
   <p:clrMapOvr>
@@ -27765,6 +27416,30 @@
               <a:latin typeface="Courier New"/>
               <a:cs typeface="Courier New"/>
             </a:endParaRPr>
+          </a:p>
+        </p:txBody>
+      </p:sp>
+      <p:sp>
+        <p:nvSpPr>
+          <p:cNvPr id="38" name="Slide Number Placeholder 37"/>
+          <p:cNvSpPr>
+            <a:spLocks noGrp="1"/>
+          </p:cNvSpPr>
+          <p:nvPr>
+            <p:ph type="sldNum" sz="quarter" idx="10"/>
+          </p:nvPr>
+        </p:nvSpPr>
+        <p:spPr/>
+        <p:txBody>
+          <a:bodyPr/>
+          <a:lstStyle/>
+          <a:p>
+            <a:fld id="{F32B063D-AEFC-43D4-892A-5496DB603272}" type="slidenum">
+              <a:rPr lang="en-US" smtClean="0"/>
+              <a:pPr/>
+              <a:t>12</a:t>
+            </a:fld>
+            <a:endParaRPr lang="en-US"/>
           </a:p>
         </p:txBody>
       </p:sp>
@@ -28018,13 +27693,13 @@
   <p:clrMapOvr>
     <a:masterClrMapping/>
   </p:clrMapOvr>
-  <mc:AlternateContent xmlns:mc="http://schemas.openxmlformats.org/markup-compatibility/2006">
-    <mc:Choice xmlns:p14="http://schemas.microsoft.com/office/powerpoint/2010/main" Requires="p14">
+  <mc:AlternateContent xmlns:mc="http://schemas.openxmlformats.org/markup-compatibility/2006" xmlns:p14="http://schemas.microsoft.com/office/powerpoint/2010/main">
+    <mc:Choice Requires="p14">
       <p:transition spd="med" p14:dur="700">
         <p:fade/>
       </p:transition>
     </mc:Choice>
-    <mc:Fallback>
+    <mc:Fallback xmlns="">
       <p:transition spd="med">
         <p:fade/>
       </p:transition>
@@ -29618,6 +29293,30 @@
           </a:p>
         </p:txBody>
       </p:sp>
+      <p:sp>
+        <p:nvSpPr>
+          <p:cNvPr id="4" name="Slide Number Placeholder 3"/>
+          <p:cNvSpPr>
+            <a:spLocks noGrp="1"/>
+          </p:cNvSpPr>
+          <p:nvPr>
+            <p:ph type="sldNum" sz="quarter" idx="10"/>
+          </p:nvPr>
+        </p:nvSpPr>
+        <p:spPr/>
+        <p:txBody>
+          <a:bodyPr/>
+          <a:lstStyle/>
+          <a:p>
+            <a:fld id="{F32B063D-AEFC-43D4-892A-5496DB603272}" type="slidenum">
+              <a:rPr lang="en-US" smtClean="0"/>
+              <a:pPr/>
+              <a:t>14</a:t>
+            </a:fld>
+            <a:endParaRPr lang="en-US"/>
+          </a:p>
+        </p:txBody>
+      </p:sp>
     </p:spTree>
   </p:cSld>
   <p:clrMapOvr>
@@ -32671,44 +32370,6 @@
       </p:sp>
       <p:sp>
         <p:nvSpPr>
-          <p:cNvPr id="41" name="object 41"/>
-          <p:cNvSpPr txBox="1">
-            <a:spLocks noGrp="1"/>
-          </p:cNvSpPr>
-          <p:nvPr>
-            <p:ph type="sldNum" sz="quarter" idx="12"/>
-          </p:nvPr>
-        </p:nvSpPr>
-        <p:spPr>
-          <a:xfrm>
-            <a:off x="7988999" y="8860816"/>
-            <a:ext cx="241300" cy="215444"/>
-          </a:xfrm>
-          <a:prstGeom prst="rect">
-            <a:avLst/>
-          </a:prstGeom>
-        </p:spPr>
-        <p:txBody>
-          <a:bodyPr vert="horz" wrap="square" lIns="0" tIns="0" rIns="0" bIns="0" rtlCol="0">
-            <a:spAutoFit/>
-          </a:bodyPr>
-          <a:lstStyle/>
-          <a:p>
-            <a:pPr marL="25400">
-              <a:lnSpc>
-                <a:spcPct val="100000"/>
-              </a:lnSpc>
-            </a:pPr>
-            <a:fld id="{81D60167-4931-47E6-BA6A-407CBD079E47}" type="slidenum">
-              <a:rPr sz="1400" dirty="0"/>
-              <a:t>2</a:t>
-            </a:fld>
-            <a:endParaRPr sz="1400" dirty="0"/>
-          </a:p>
-        </p:txBody>
-      </p:sp>
-      <p:sp>
-        <p:nvSpPr>
           <p:cNvPr id="40" name="object 40"/>
           <p:cNvSpPr txBox="1"/>
           <p:nvPr/>
@@ -33011,6 +32672,30 @@
               <a:latin typeface="Arial"/>
               <a:cs typeface="Arial"/>
             </a:endParaRPr>
+          </a:p>
+        </p:txBody>
+      </p:sp>
+      <p:sp>
+        <p:nvSpPr>
+          <p:cNvPr id="38" name="Slide Number Placeholder 37"/>
+          <p:cNvSpPr>
+            <a:spLocks noGrp="1"/>
+          </p:cNvSpPr>
+          <p:nvPr>
+            <p:ph type="sldNum" sz="quarter" idx="10"/>
+          </p:nvPr>
+        </p:nvSpPr>
+        <p:spPr/>
+        <p:txBody>
+          <a:bodyPr/>
+          <a:lstStyle/>
+          <a:p>
+            <a:fld id="{F32B063D-AEFC-43D4-892A-5496DB603272}" type="slidenum">
+              <a:rPr lang="en-US" smtClean="0"/>
+              <a:pPr/>
+              <a:t>2</a:t>
+            </a:fld>
+            <a:endParaRPr lang="en-US"/>
           </a:p>
         </p:txBody>
       </p:sp>
@@ -36023,6 +35708,10 @@
           </p:nvPr>
         </p:nvSpPr>
         <p:spPr>
+          <a:xfrm>
+            <a:off x="825500" y="305359"/>
+            <a:ext cx="14605000" cy="939800"/>
+          </a:xfrm>
           <a:prstGeom prst="rect">
             <a:avLst/>
           </a:prstGeom>
@@ -36583,6 +36272,30 @@
           <a:lstStyle/>
           <a:p>
             <a:endParaRPr dirty="0"/>
+          </a:p>
+        </p:txBody>
+      </p:sp>
+      <p:sp>
+        <p:nvSpPr>
+          <p:cNvPr id="44" name="Slide Number Placeholder 43"/>
+          <p:cNvSpPr>
+            <a:spLocks noGrp="1"/>
+          </p:cNvSpPr>
+          <p:nvPr>
+            <p:ph type="sldNum" sz="quarter" idx="10"/>
+          </p:nvPr>
+        </p:nvSpPr>
+        <p:spPr/>
+        <p:txBody>
+          <a:bodyPr/>
+          <a:lstStyle/>
+          <a:p>
+            <a:fld id="{F32B063D-AEFC-43D4-892A-5496DB603272}" type="slidenum">
+              <a:rPr lang="en-US" smtClean="0"/>
+              <a:pPr/>
+              <a:t>3</a:t>
+            </a:fld>
+            <a:endParaRPr lang="en-US"/>
           </a:p>
         </p:txBody>
       </p:sp>
@@ -39326,6 +39039,10 @@
           </p:nvPr>
         </p:nvSpPr>
         <p:spPr>
+          <a:xfrm>
+            <a:off x="825500" y="305359"/>
+            <a:ext cx="14605000" cy="939800"/>
+          </a:xfrm>
           <a:prstGeom prst="rect">
             <a:avLst/>
           </a:prstGeom>
@@ -40347,6 +40064,30 @@
               <a:latin typeface="Arial"/>
               <a:cs typeface="Arial"/>
             </a:endParaRPr>
+          </a:p>
+        </p:txBody>
+      </p:sp>
+      <p:sp>
+        <p:nvSpPr>
+          <p:cNvPr id="38" name="Slide Number Placeholder 37"/>
+          <p:cNvSpPr>
+            <a:spLocks noGrp="1"/>
+          </p:cNvSpPr>
+          <p:nvPr>
+            <p:ph type="sldNum" sz="quarter" idx="10"/>
+          </p:nvPr>
+        </p:nvSpPr>
+        <p:spPr/>
+        <p:txBody>
+          <a:bodyPr/>
+          <a:lstStyle/>
+          <a:p>
+            <a:fld id="{F32B063D-AEFC-43D4-892A-5496DB603272}" type="slidenum">
+              <a:rPr lang="en-US" smtClean="0"/>
+              <a:pPr/>
+              <a:t>4</a:t>
+            </a:fld>
+            <a:endParaRPr lang="en-US"/>
           </a:p>
         </p:txBody>
       </p:sp>
@@ -43354,6 +43095,10 @@
           </p:nvPr>
         </p:nvSpPr>
         <p:spPr>
+          <a:xfrm>
+            <a:off x="825500" y="305359"/>
+            <a:ext cx="14605000" cy="939800"/>
+          </a:xfrm>
           <a:prstGeom prst="rect">
             <a:avLst/>
           </a:prstGeom>
@@ -44149,6 +43894,30 @@
           <a:lstStyle/>
           <a:p>
             <a:endParaRPr dirty="0"/>
+          </a:p>
+        </p:txBody>
+      </p:sp>
+      <p:sp>
+        <p:nvSpPr>
+          <p:cNvPr id="38" name="Slide Number Placeholder 37"/>
+          <p:cNvSpPr>
+            <a:spLocks noGrp="1"/>
+          </p:cNvSpPr>
+          <p:nvPr>
+            <p:ph type="sldNum" sz="quarter" idx="10"/>
+          </p:nvPr>
+        </p:nvSpPr>
+        <p:spPr/>
+        <p:txBody>
+          <a:bodyPr/>
+          <a:lstStyle/>
+          <a:p>
+            <a:fld id="{F32B063D-AEFC-43D4-892A-5496DB603272}" type="slidenum">
+              <a:rPr lang="en-US" smtClean="0"/>
+              <a:pPr/>
+              <a:t>5</a:t>
+            </a:fld>
+            <a:endParaRPr lang="en-US"/>
           </a:p>
         </p:txBody>
       </p:sp>
@@ -47952,6 +47721,30 @@
           </a:p>
         </p:txBody>
       </p:sp>
+      <p:sp>
+        <p:nvSpPr>
+          <p:cNvPr id="38" name="Slide Number Placeholder 37"/>
+          <p:cNvSpPr>
+            <a:spLocks noGrp="1"/>
+          </p:cNvSpPr>
+          <p:nvPr>
+            <p:ph type="sldNum" sz="quarter" idx="10"/>
+          </p:nvPr>
+        </p:nvSpPr>
+        <p:spPr/>
+        <p:txBody>
+          <a:bodyPr/>
+          <a:lstStyle/>
+          <a:p>
+            <a:fld id="{F32B063D-AEFC-43D4-892A-5496DB603272}" type="slidenum">
+              <a:rPr lang="en-US" smtClean="0"/>
+              <a:pPr/>
+              <a:t>6</a:t>
+            </a:fld>
+            <a:endParaRPr lang="en-US"/>
+          </a:p>
+        </p:txBody>
+      </p:sp>
     </p:spTree>
   </p:cSld>
   <p:clrMapOvr>
@@ -49593,6 +49386,30 @@
           </a:p>
         </p:txBody>
       </p:sp>
+      <p:sp>
+        <p:nvSpPr>
+          <p:cNvPr id="4" name="Slide Number Placeholder 3"/>
+          <p:cNvSpPr>
+            <a:spLocks noGrp="1"/>
+          </p:cNvSpPr>
+          <p:nvPr>
+            <p:ph type="sldNum" sz="quarter" idx="10"/>
+          </p:nvPr>
+        </p:nvSpPr>
+        <p:spPr/>
+        <p:txBody>
+          <a:bodyPr/>
+          <a:lstStyle/>
+          <a:p>
+            <a:fld id="{F32B063D-AEFC-43D4-892A-5496DB603272}" type="slidenum">
+              <a:rPr lang="en-US" smtClean="0"/>
+              <a:pPr/>
+              <a:t>7</a:t>
+            </a:fld>
+            <a:endParaRPr lang="en-US"/>
+          </a:p>
+        </p:txBody>
+      </p:sp>
     </p:spTree>
   </p:cSld>
   <p:clrMapOvr>
@@ -50407,6 +50224,30 @@
               <a:t>c</a:t>
             </a:r>
             <a:endParaRPr dirty="0"/>
+          </a:p>
+        </p:txBody>
+      </p:sp>
+      <p:sp>
+        <p:nvSpPr>
+          <p:cNvPr id="4" name="Slide Number Placeholder 3"/>
+          <p:cNvSpPr>
+            <a:spLocks noGrp="1"/>
+          </p:cNvSpPr>
+          <p:nvPr>
+            <p:ph type="sldNum" sz="quarter" idx="10"/>
+          </p:nvPr>
+        </p:nvSpPr>
+        <p:spPr/>
+        <p:txBody>
+          <a:bodyPr/>
+          <a:lstStyle/>
+          <a:p>
+            <a:fld id="{F32B063D-AEFC-43D4-892A-5496DB603272}" type="slidenum">
+              <a:rPr lang="en-US" smtClean="0"/>
+              <a:pPr/>
+              <a:t>8</a:t>
+            </a:fld>
+            <a:endParaRPr lang="en-US"/>
           </a:p>
         </p:txBody>
       </p:sp>
@@ -52566,6 +52407,30 @@
               <a:latin typeface="Courier New"/>
               <a:cs typeface="Courier New"/>
             </a:endParaRPr>
+          </a:p>
+        </p:txBody>
+      </p:sp>
+      <p:sp>
+        <p:nvSpPr>
+          <p:cNvPr id="4" name="Slide Number Placeholder 3"/>
+          <p:cNvSpPr>
+            <a:spLocks noGrp="1"/>
+          </p:cNvSpPr>
+          <p:nvPr>
+            <p:ph type="sldNum" sz="quarter" idx="10"/>
+          </p:nvPr>
+        </p:nvSpPr>
+        <p:spPr/>
+        <p:txBody>
+          <a:bodyPr/>
+          <a:lstStyle/>
+          <a:p>
+            <a:fld id="{F32B063D-AEFC-43D4-892A-5496DB603272}" type="slidenum">
+              <a:rPr lang="en-US" smtClean="0"/>
+              <a:pPr/>
+              <a:t>9</a:t>
+            </a:fld>
+            <a:endParaRPr lang="en-US"/>
           </a:p>
         </p:txBody>
       </p:sp>

</xml_diff>